<commit_message>
Starting code for the command, command groups, and command schedler
</commit_message>
<xml_diff>
--- a/INFO6044/D2D/W_04_to_08_Patterns_1/Abstract_Factory, Manager, Mediator, Command.pptx
+++ b/INFO6044/D2D/W_04_to_08_Patterns_1/Abstract_Factory, Manager, Mediator, Command.pptx
@@ -8,6 +8,10 @@
     <p:sldId id="256" r:id="rId2"/>
     <p:sldId id="257" r:id="rId3"/>
     <p:sldId id="258" r:id="rId4"/>
+    <p:sldId id="259" r:id="rId5"/>
+    <p:sldId id="260" r:id="rId6"/>
+    <p:sldId id="261" r:id="rId7"/>
+    <p:sldId id="262" r:id="rId8"/>
   </p:sldIdLst>
   <p:sldSz cx="12192000" cy="6858000"/>
   <p:notesSz cx="6858000" cy="9144000"/>
@@ -106,6 +110,11 @@
       </a:defRPr>
     </a:lvl9pPr>
   </p:defaultTextStyle>
+  <p:extLst>
+    <p:ext uri="{EFAFB233-063F-42B5-8137-9DF3F51BA10A}">
+      <p15:sldGuideLst xmlns:p15="http://schemas.microsoft.com/office/powerpoint/2012/main"/>
+    </p:ext>
+  </p:extLst>
 </p:presentation>
 </file>
 
@@ -258,7 +267,7 @@
           <a:p>
             <a:fld id="{9F42854E-0412-4382-AAEE-1702CFA5C8EF}" type="datetimeFigureOut">
               <a:rPr lang="en-CA" smtClean="0"/>
-              <a:t>2022-11-08</a:t>
+              <a:t>2022-11-24</a:t>
             </a:fld>
             <a:endParaRPr lang="en-CA"/>
           </a:p>
@@ -458,7 +467,7 @@
           <a:p>
             <a:fld id="{9F42854E-0412-4382-AAEE-1702CFA5C8EF}" type="datetimeFigureOut">
               <a:rPr lang="en-CA" smtClean="0"/>
-              <a:t>2022-11-08</a:t>
+              <a:t>2022-11-24</a:t>
             </a:fld>
             <a:endParaRPr lang="en-CA"/>
           </a:p>
@@ -668,7 +677,7 @@
           <a:p>
             <a:fld id="{9F42854E-0412-4382-AAEE-1702CFA5C8EF}" type="datetimeFigureOut">
               <a:rPr lang="en-CA" smtClean="0"/>
-              <a:t>2022-11-08</a:t>
+              <a:t>2022-11-24</a:t>
             </a:fld>
             <a:endParaRPr lang="en-CA"/>
           </a:p>
@@ -868,7 +877,7 @@
           <a:p>
             <a:fld id="{9F42854E-0412-4382-AAEE-1702CFA5C8EF}" type="datetimeFigureOut">
               <a:rPr lang="en-CA" smtClean="0"/>
-              <a:t>2022-11-08</a:t>
+              <a:t>2022-11-24</a:t>
             </a:fld>
             <a:endParaRPr lang="en-CA"/>
           </a:p>
@@ -1144,7 +1153,7 @@
           <a:p>
             <a:fld id="{9F42854E-0412-4382-AAEE-1702CFA5C8EF}" type="datetimeFigureOut">
               <a:rPr lang="en-CA" smtClean="0"/>
-              <a:t>2022-11-08</a:t>
+              <a:t>2022-11-24</a:t>
             </a:fld>
             <a:endParaRPr lang="en-CA"/>
           </a:p>
@@ -1412,7 +1421,7 @@
           <a:p>
             <a:fld id="{9F42854E-0412-4382-AAEE-1702CFA5C8EF}" type="datetimeFigureOut">
               <a:rPr lang="en-CA" smtClean="0"/>
-              <a:t>2022-11-08</a:t>
+              <a:t>2022-11-24</a:t>
             </a:fld>
             <a:endParaRPr lang="en-CA"/>
           </a:p>
@@ -1827,7 +1836,7 @@
           <a:p>
             <a:fld id="{9F42854E-0412-4382-AAEE-1702CFA5C8EF}" type="datetimeFigureOut">
               <a:rPr lang="en-CA" smtClean="0"/>
-              <a:t>2022-11-08</a:t>
+              <a:t>2022-11-24</a:t>
             </a:fld>
             <a:endParaRPr lang="en-CA"/>
           </a:p>
@@ -1969,7 +1978,7 @@
           <a:p>
             <a:fld id="{9F42854E-0412-4382-AAEE-1702CFA5C8EF}" type="datetimeFigureOut">
               <a:rPr lang="en-CA" smtClean="0"/>
-              <a:t>2022-11-08</a:t>
+              <a:t>2022-11-24</a:t>
             </a:fld>
             <a:endParaRPr lang="en-CA"/>
           </a:p>
@@ -2082,7 +2091,7 @@
           <a:p>
             <a:fld id="{9F42854E-0412-4382-AAEE-1702CFA5C8EF}" type="datetimeFigureOut">
               <a:rPr lang="en-CA" smtClean="0"/>
-              <a:t>2022-11-08</a:t>
+              <a:t>2022-11-24</a:t>
             </a:fld>
             <a:endParaRPr lang="en-CA"/>
           </a:p>
@@ -2395,7 +2404,7 @@
           <a:p>
             <a:fld id="{9F42854E-0412-4382-AAEE-1702CFA5C8EF}" type="datetimeFigureOut">
               <a:rPr lang="en-CA" smtClean="0"/>
-              <a:t>2022-11-08</a:t>
+              <a:t>2022-11-24</a:t>
             </a:fld>
             <a:endParaRPr lang="en-CA"/>
           </a:p>
@@ -2684,7 +2693,7 @@
           <a:p>
             <a:fld id="{9F42854E-0412-4382-AAEE-1702CFA5C8EF}" type="datetimeFigureOut">
               <a:rPr lang="en-CA" smtClean="0"/>
-              <a:t>2022-11-08</a:t>
+              <a:t>2022-11-24</a:t>
             </a:fld>
             <a:endParaRPr lang="en-CA"/>
           </a:p>
@@ -2927,7 +2936,7 @@
           <a:p>
             <a:fld id="{9F42854E-0412-4382-AAEE-1702CFA5C8EF}" type="datetimeFigureOut">
               <a:rPr lang="en-CA" smtClean="0"/>
-              <a:t>2022-11-08</a:t>
+              <a:t>2022-11-24</a:t>
             </a:fld>
             <a:endParaRPr lang="en-CA"/>
           </a:p>
@@ -4113,6 +4122,1255 @@
     <p:extLst>
       <p:ext uri="{BB962C8B-B14F-4D97-AF65-F5344CB8AC3E}">
         <p14:creationId xmlns:p14="http://schemas.microsoft.com/office/powerpoint/2010/main" val="884514433"/>
+      </p:ext>
+    </p:extLst>
+  </p:cSld>
+  <p:clrMapOvr>
+    <a:masterClrMapping/>
+  </p:clrMapOvr>
+</p:sld>
+</file>
+
+<file path=ppt/slides/slide4.xml><?xml version="1.0" encoding="utf-8"?>
+<p:sld xmlns:a="http://schemas.openxmlformats.org/drawingml/2006/main" xmlns:r="http://schemas.openxmlformats.org/officeDocument/2006/relationships" xmlns:p="http://schemas.openxmlformats.org/presentationml/2006/main">
+  <p:cSld>
+    <p:spTree>
+      <p:nvGrpSpPr>
+        <p:cNvPr id="1" name=""/>
+        <p:cNvGrpSpPr/>
+        <p:nvPr/>
+      </p:nvGrpSpPr>
+      <p:grpSpPr>
+        <a:xfrm>
+          <a:off x="0" y="0"/>
+          <a:ext cx="0" cy="0"/>
+          <a:chOff x="0" y="0"/>
+          <a:chExt cx="0" cy="0"/>
+        </a:xfrm>
+      </p:grpSpPr>
+      <p:sp>
+        <p:nvSpPr>
+          <p:cNvPr id="4" name="Rectangle: Rounded Corners 3">
+            <a:extLst>
+              <a:ext uri="{FF2B5EF4-FFF2-40B4-BE49-F238E27FC236}">
+                <a16:creationId xmlns:a16="http://schemas.microsoft.com/office/drawing/2014/main" id="{E7F39049-C890-5C23-5B04-F6AC400629B2}"/>
+              </a:ext>
+            </a:extLst>
+          </p:cNvPr>
+          <p:cNvSpPr/>
+          <p:nvPr/>
+        </p:nvSpPr>
+        <p:spPr>
+          <a:xfrm>
+            <a:off x="8839199" y="245809"/>
+            <a:ext cx="2566220" cy="1740309"/>
+          </a:xfrm>
+          <a:prstGeom prst="roundRect">
+            <a:avLst/>
+          </a:prstGeom>
+        </p:spPr>
+        <p:style>
+          <a:lnRef idx="2">
+            <a:schemeClr val="accent1">
+              <a:shade val="50000"/>
+            </a:schemeClr>
+          </a:lnRef>
+          <a:fillRef idx="1">
+            <a:schemeClr val="accent1"/>
+          </a:fillRef>
+          <a:effectRef idx="0">
+            <a:schemeClr val="accent1"/>
+          </a:effectRef>
+          <a:fontRef idx="minor">
+            <a:schemeClr val="lt1"/>
+          </a:fontRef>
+        </p:style>
+        <p:txBody>
+          <a:bodyPr rtlCol="0" anchor="ctr"/>
+          <a:lstStyle/>
+          <a:p>
+            <a:pPr algn="ctr"/>
+            <a:r>
+              <a:rPr lang="en-CA" sz="2800" b="1" dirty="0" err="1"/>
+              <a:t>cAnimal</a:t>
+            </a:r>
+            <a:endParaRPr lang="en-CA" b="1" dirty="0"/>
+          </a:p>
+          <a:p>
+            <a:pPr algn="ctr"/>
+            <a:r>
+              <a:rPr lang="en-CA" dirty="0" err="1"/>
+              <a:t>findPrey</a:t>
+            </a:r>
+            <a:r>
+              <a:rPr lang="en-CA" dirty="0"/>
+              <a:t>()</a:t>
+            </a:r>
+          </a:p>
+          <a:p>
+            <a:pPr algn="ctr"/>
+            <a:r>
+              <a:rPr lang="en-CA" dirty="0" err="1"/>
+              <a:t>chasePrey</a:t>
+            </a:r>
+            <a:r>
+              <a:rPr lang="en-CA" dirty="0"/>
+              <a:t>()</a:t>
+            </a:r>
+          </a:p>
+          <a:p>
+            <a:pPr algn="ctr"/>
+            <a:r>
+              <a:rPr lang="en-CA" dirty="0" err="1"/>
+              <a:t>eatPrey</a:t>
+            </a:r>
+            <a:r>
+              <a:rPr lang="en-CA" dirty="0"/>
+              <a:t>()</a:t>
+            </a:r>
+          </a:p>
+        </p:txBody>
+      </p:sp>
+      <p:sp>
+        <p:nvSpPr>
+          <p:cNvPr id="5" name="TextBox 4">
+            <a:extLst>
+              <a:ext uri="{FF2B5EF4-FFF2-40B4-BE49-F238E27FC236}">
+                <a16:creationId xmlns:a16="http://schemas.microsoft.com/office/drawing/2014/main" id="{32C12A0A-2F9D-9761-7C21-1277CCEBDA65}"/>
+              </a:ext>
+            </a:extLst>
+          </p:cNvPr>
+          <p:cNvSpPr txBox="1"/>
+          <p:nvPr/>
+        </p:nvSpPr>
+        <p:spPr>
+          <a:xfrm>
+            <a:off x="373625" y="363794"/>
+            <a:ext cx="7580671" cy="2308324"/>
+          </a:xfrm>
+          <a:prstGeom prst="rect">
+            <a:avLst/>
+          </a:prstGeom>
+          <a:noFill/>
+        </p:spPr>
+        <p:txBody>
+          <a:bodyPr wrap="square" rtlCol="0">
+            <a:spAutoFit/>
+          </a:bodyPr>
+          <a:lstStyle/>
+          <a:p>
+            <a:r>
+              <a:rPr lang="en-US" dirty="0" err="1"/>
+              <a:t>findPrey</a:t>
+            </a:r>
+            <a:r>
+              <a:rPr lang="en-US" dirty="0"/>
+              <a:t>();</a:t>
+            </a:r>
+          </a:p>
+          <a:p>
+            <a:pPr marL="285750" indent="-285750">
+              <a:buFontTx/>
+              <a:buChar char="-"/>
+            </a:pPr>
+            <a:r>
+              <a:rPr lang="en-US" dirty="0" err="1"/>
+              <a:t>AtStart</a:t>
+            </a:r>
+            <a:r>
+              <a:rPr lang="en-US" dirty="0"/>
+              <a:t>:</a:t>
+            </a:r>
+          </a:p>
+          <a:p>
+            <a:pPr marL="742950" lvl="1" indent="-285750">
+              <a:buFontTx/>
+              <a:buChar char="-"/>
+            </a:pPr>
+            <a:r>
+              <a:rPr lang="en-US" dirty="0"/>
+              <a:t>Ask mediator where nearest prey type is</a:t>
+            </a:r>
+          </a:p>
+          <a:p>
+            <a:pPr marL="742950" lvl="1" indent="-285750">
+              <a:buFontTx/>
+              <a:buChar char="-"/>
+            </a:pPr>
+            <a:r>
+              <a:rPr lang="en-US" dirty="0"/>
+              <a:t>Turn towards prey </a:t>
+            </a:r>
+          </a:p>
+          <a:p>
+            <a:pPr marL="742950" lvl="1" indent="-285750">
+              <a:buFontTx/>
+              <a:buChar char="-"/>
+            </a:pPr>
+            <a:r>
+              <a:rPr lang="en-US" dirty="0"/>
+              <a:t>Move towards prey	</a:t>
+            </a:r>
+          </a:p>
+          <a:p>
+            <a:pPr marL="285750" indent="-285750">
+              <a:buFontTx/>
+              <a:buChar char="-"/>
+            </a:pPr>
+            <a:r>
+              <a:rPr lang="en-US" dirty="0"/>
+              <a:t>Ongoing:</a:t>
+            </a:r>
+          </a:p>
+          <a:p>
+            <a:pPr marL="742950" lvl="1" indent="-285750">
+              <a:buFontTx/>
+              <a:buChar char="-"/>
+            </a:pPr>
+            <a:r>
+              <a:rPr lang="en-US" dirty="0" err="1"/>
+              <a:t>chasePrey</a:t>
+            </a:r>
+            <a:r>
+              <a:rPr lang="en-US" dirty="0"/>
+              <a:t>()</a:t>
+            </a:r>
+          </a:p>
+          <a:p>
+            <a:pPr marL="742950" lvl="1" indent="-285750">
+              <a:buFontTx/>
+              <a:buChar char="-"/>
+            </a:pPr>
+            <a:r>
+              <a:rPr lang="en-US" dirty="0"/>
+              <a:t>Is prey still alive? </a:t>
+            </a:r>
+          </a:p>
+        </p:txBody>
+      </p:sp>
+      <p:sp>
+        <p:nvSpPr>
+          <p:cNvPr id="6" name="TextBox 5">
+            <a:extLst>
+              <a:ext uri="{FF2B5EF4-FFF2-40B4-BE49-F238E27FC236}">
+                <a16:creationId xmlns:a16="http://schemas.microsoft.com/office/drawing/2014/main" id="{42EC89C4-1D30-BD19-A513-33E4F014A460}"/>
+              </a:ext>
+            </a:extLst>
+          </p:cNvPr>
+          <p:cNvSpPr txBox="1"/>
+          <p:nvPr/>
+        </p:nvSpPr>
+        <p:spPr>
+          <a:xfrm>
+            <a:off x="344128" y="3569110"/>
+            <a:ext cx="7580671" cy="2308324"/>
+          </a:xfrm>
+          <a:prstGeom prst="rect">
+            <a:avLst/>
+          </a:prstGeom>
+          <a:noFill/>
+        </p:spPr>
+        <p:txBody>
+          <a:bodyPr wrap="square" rtlCol="0">
+            <a:spAutoFit/>
+          </a:bodyPr>
+          <a:lstStyle/>
+          <a:p>
+            <a:r>
+              <a:rPr lang="en-US" dirty="0" err="1"/>
+              <a:t>chasePrey</a:t>
+            </a:r>
+            <a:r>
+              <a:rPr lang="en-US" dirty="0"/>
+              <a:t>();</a:t>
+            </a:r>
+          </a:p>
+          <a:p>
+            <a:pPr marL="285750" indent="-285750">
+              <a:buFontTx/>
+              <a:buChar char="-"/>
+            </a:pPr>
+            <a:r>
+              <a:rPr lang="en-US" dirty="0" err="1"/>
+              <a:t>AtStart</a:t>
+            </a:r>
+            <a:r>
+              <a:rPr lang="en-US" dirty="0"/>
+              <a:t>:</a:t>
+            </a:r>
+          </a:p>
+          <a:p>
+            <a:pPr marL="742950" lvl="1" indent="-285750">
+              <a:buFontTx/>
+              <a:buChar char="-"/>
+            </a:pPr>
+            <a:r>
+              <a:rPr lang="en-US" dirty="0" err="1"/>
+              <a:t>findPrey</a:t>
+            </a:r>
+            <a:r>
+              <a:rPr lang="en-US" dirty="0"/>
+              <a:t> ()</a:t>
+            </a:r>
+          </a:p>
+          <a:p>
+            <a:pPr marL="285750" indent="-285750">
+              <a:buFontTx/>
+              <a:buChar char="-"/>
+            </a:pPr>
+            <a:r>
+              <a:rPr lang="en-US" dirty="0"/>
+              <a:t>Ongoing:</a:t>
+            </a:r>
+          </a:p>
+          <a:p>
+            <a:pPr marL="742950" lvl="1" indent="-285750">
+              <a:buFontTx/>
+              <a:buChar char="-"/>
+            </a:pPr>
+            <a:r>
+              <a:rPr lang="en-US" dirty="0"/>
+              <a:t>Stop when I’m “close enough” to prey</a:t>
+            </a:r>
+          </a:p>
+          <a:p>
+            <a:pPr marL="742950" lvl="1" indent="-285750">
+              <a:buFontTx/>
+              <a:buChar char="-"/>
+            </a:pPr>
+            <a:r>
+              <a:rPr lang="en-US" dirty="0"/>
+              <a:t>Change direction to face prey</a:t>
+            </a:r>
+          </a:p>
+          <a:p>
+            <a:pPr marL="1200150" lvl="2" indent="-285750">
+              <a:buFontTx/>
+              <a:buChar char="-"/>
+            </a:pPr>
+            <a:r>
+              <a:rPr lang="en-US" dirty="0"/>
+              <a:t>Asking the mediator where the prey is now, or something like that</a:t>
+            </a:r>
+          </a:p>
+          <a:p>
+            <a:pPr marL="742950" lvl="1" indent="-285750">
+              <a:buFontTx/>
+              <a:buChar char="-"/>
+            </a:pPr>
+            <a:r>
+              <a:rPr lang="en-US" dirty="0"/>
+              <a:t>Is prey still alive? </a:t>
+            </a:r>
+          </a:p>
+        </p:txBody>
+      </p:sp>
+    </p:spTree>
+    <p:extLst>
+      <p:ext uri="{BB962C8B-B14F-4D97-AF65-F5344CB8AC3E}">
+        <p14:creationId xmlns:p14="http://schemas.microsoft.com/office/powerpoint/2010/main" val="2342541169"/>
+      </p:ext>
+    </p:extLst>
+  </p:cSld>
+  <p:clrMapOvr>
+    <a:masterClrMapping/>
+  </p:clrMapOvr>
+</p:sld>
+</file>
+
+<file path=ppt/slides/slide5.xml><?xml version="1.0" encoding="utf-8"?>
+<p:sld xmlns:a="http://schemas.openxmlformats.org/drawingml/2006/main" xmlns:r="http://schemas.openxmlformats.org/officeDocument/2006/relationships" xmlns:p="http://schemas.openxmlformats.org/presentationml/2006/main">
+  <p:cSld>
+    <p:spTree>
+      <p:nvGrpSpPr>
+        <p:cNvPr id="1" name=""/>
+        <p:cNvGrpSpPr/>
+        <p:nvPr/>
+      </p:nvGrpSpPr>
+      <p:grpSpPr>
+        <a:xfrm>
+          <a:off x="0" y="0"/>
+          <a:ext cx="0" cy="0"/>
+          <a:chOff x="0" y="0"/>
+          <a:chExt cx="0" cy="0"/>
+        </a:xfrm>
+      </p:grpSpPr>
+      <p:sp>
+        <p:nvSpPr>
+          <p:cNvPr id="4" name="Rectangle: Rounded Corners 3">
+            <a:extLst>
+              <a:ext uri="{FF2B5EF4-FFF2-40B4-BE49-F238E27FC236}">
+                <a16:creationId xmlns:a16="http://schemas.microsoft.com/office/drawing/2014/main" id="{E7F39049-C890-5C23-5B04-F6AC400629B2}"/>
+              </a:ext>
+            </a:extLst>
+          </p:cNvPr>
+          <p:cNvSpPr/>
+          <p:nvPr/>
+        </p:nvSpPr>
+        <p:spPr>
+          <a:xfrm>
+            <a:off x="8839199" y="245809"/>
+            <a:ext cx="2566220" cy="2163094"/>
+          </a:xfrm>
+          <a:prstGeom prst="roundRect">
+            <a:avLst/>
+          </a:prstGeom>
+        </p:spPr>
+        <p:style>
+          <a:lnRef idx="2">
+            <a:schemeClr val="accent1">
+              <a:shade val="50000"/>
+            </a:schemeClr>
+          </a:lnRef>
+          <a:fillRef idx="1">
+            <a:schemeClr val="accent1"/>
+          </a:fillRef>
+          <a:effectRef idx="0">
+            <a:schemeClr val="accent1"/>
+          </a:effectRef>
+          <a:fontRef idx="minor">
+            <a:schemeClr val="lt1"/>
+          </a:fontRef>
+        </p:style>
+        <p:txBody>
+          <a:bodyPr rtlCol="0" anchor="ctr"/>
+          <a:lstStyle/>
+          <a:p>
+            <a:pPr algn="ctr"/>
+            <a:r>
+              <a:rPr lang="en-CA" sz="2800" b="1" dirty="0" err="1"/>
+              <a:t>cAnimal</a:t>
+            </a:r>
+            <a:endParaRPr lang="en-CA" b="1" dirty="0"/>
+          </a:p>
+          <a:p>
+            <a:pPr algn="ctr"/>
+            <a:r>
+              <a:rPr lang="en-CA" dirty="0"/>
+              <a:t>Turn();</a:t>
+            </a:r>
+          </a:p>
+          <a:p>
+            <a:pPr algn="ctr"/>
+            <a:r>
+              <a:rPr lang="en-CA" dirty="0"/>
+              <a:t>Move();</a:t>
+            </a:r>
+          </a:p>
+          <a:p>
+            <a:pPr algn="ctr"/>
+            <a:r>
+              <a:rPr lang="en-CA" dirty="0"/>
+              <a:t>Rest();</a:t>
+            </a:r>
+          </a:p>
+        </p:txBody>
+      </p:sp>
+      <p:sp>
+        <p:nvSpPr>
+          <p:cNvPr id="2" name="Rectangle: Rounded Corners 1">
+            <a:extLst>
+              <a:ext uri="{FF2B5EF4-FFF2-40B4-BE49-F238E27FC236}">
+                <a16:creationId xmlns:a16="http://schemas.microsoft.com/office/drawing/2014/main" id="{5CC9F4D4-F96B-D681-E028-D1CC153A3B99}"/>
+              </a:ext>
+            </a:extLst>
+          </p:cNvPr>
+          <p:cNvSpPr/>
+          <p:nvPr/>
+        </p:nvSpPr>
+        <p:spPr>
+          <a:xfrm>
+            <a:off x="314630" y="167152"/>
+            <a:ext cx="5594557" cy="3618268"/>
+          </a:xfrm>
+          <a:prstGeom prst="roundRect">
+            <a:avLst/>
+          </a:prstGeom>
+        </p:spPr>
+        <p:style>
+          <a:lnRef idx="2">
+            <a:schemeClr val="accent1">
+              <a:shade val="50000"/>
+            </a:schemeClr>
+          </a:lnRef>
+          <a:fillRef idx="1">
+            <a:schemeClr val="accent1"/>
+          </a:fillRef>
+          <a:effectRef idx="0">
+            <a:schemeClr val="accent1"/>
+          </a:effectRef>
+          <a:fontRef idx="minor">
+            <a:schemeClr val="lt1"/>
+          </a:fontRef>
+        </p:style>
+        <p:txBody>
+          <a:bodyPr rtlCol="0" anchor="ctr"/>
+          <a:lstStyle/>
+          <a:p>
+            <a:pPr algn="ctr"/>
+            <a:r>
+              <a:rPr lang="en-CA" sz="2800" b="1" dirty="0"/>
+              <a:t>(</a:t>
+            </a:r>
+            <a:r>
+              <a:rPr lang="en-CA" sz="2800" b="1" dirty="0" err="1"/>
+              <a:t>cCommand</a:t>
+            </a:r>
+            <a:r>
+              <a:rPr lang="en-CA" sz="2800" b="1" dirty="0"/>
+              <a:t>)</a:t>
+            </a:r>
+          </a:p>
+          <a:p>
+            <a:pPr algn="ctr"/>
+            <a:r>
+              <a:rPr lang="en-CA" sz="2800" b="1" dirty="0" err="1"/>
+              <a:t>findPrey</a:t>
+            </a:r>
+            <a:endParaRPr lang="en-CA" sz="2800" b="1" dirty="0"/>
+          </a:p>
+          <a:p>
+            <a:pPr marL="285750" indent="-285750">
+              <a:buFontTx/>
+              <a:buChar char="-"/>
+            </a:pPr>
+            <a:r>
+              <a:rPr lang="en-US" dirty="0" err="1"/>
+              <a:t>AtStart</a:t>
+            </a:r>
+            <a:r>
+              <a:rPr lang="en-US" dirty="0"/>
+              <a:t>:</a:t>
+            </a:r>
+          </a:p>
+          <a:p>
+            <a:pPr marL="742950" lvl="1" indent="-285750">
+              <a:buFontTx/>
+              <a:buChar char="-"/>
+            </a:pPr>
+            <a:r>
+              <a:rPr lang="en-US" dirty="0"/>
+              <a:t>Ask mediator where nearest prey type is</a:t>
+            </a:r>
+          </a:p>
+          <a:p>
+            <a:pPr marL="742950" lvl="1" indent="-285750">
+              <a:buFontTx/>
+              <a:buChar char="-"/>
+            </a:pPr>
+            <a:r>
+              <a:rPr lang="en-US" dirty="0" err="1"/>
+              <a:t>pAnimal</a:t>
+            </a:r>
+            <a:r>
+              <a:rPr lang="en-US" dirty="0"/>
+              <a:t>-&gt;Turn()</a:t>
+            </a:r>
+          </a:p>
+          <a:p>
+            <a:pPr marL="742950" lvl="1" indent="-285750">
+              <a:buFontTx/>
+              <a:buChar char="-"/>
+            </a:pPr>
+            <a:r>
+              <a:rPr lang="en-US" dirty="0" err="1"/>
+              <a:t>pAnimal</a:t>
+            </a:r>
+            <a:r>
+              <a:rPr lang="en-US" dirty="0"/>
+              <a:t>-&gt;Move()	</a:t>
+            </a:r>
+          </a:p>
+          <a:p>
+            <a:pPr marL="285750" indent="-285750">
+              <a:buFontTx/>
+              <a:buChar char="-"/>
+            </a:pPr>
+            <a:r>
+              <a:rPr lang="en-US" dirty="0"/>
+              <a:t>Ongoing:</a:t>
+            </a:r>
+          </a:p>
+          <a:p>
+            <a:pPr marL="742950" lvl="1" indent="-285750">
+              <a:buFontTx/>
+              <a:buChar char="-"/>
+            </a:pPr>
+            <a:r>
+              <a:rPr lang="en-US" dirty="0" err="1"/>
+              <a:t>chasePrey</a:t>
+            </a:r>
+            <a:r>
+              <a:rPr lang="en-US" dirty="0"/>
+              <a:t>()</a:t>
+            </a:r>
+          </a:p>
+          <a:p>
+            <a:pPr marL="742950" lvl="1" indent="-285750">
+              <a:buFontTx/>
+              <a:buChar char="-"/>
+            </a:pPr>
+            <a:r>
+              <a:rPr lang="en-US" dirty="0"/>
+              <a:t>Is prey still alive? </a:t>
+            </a:r>
+          </a:p>
+          <a:p>
+            <a:pPr algn="ctr"/>
+            <a:endParaRPr lang="en-CA" sz="2800" b="1" dirty="0"/>
+          </a:p>
+          <a:p>
+            <a:pPr algn="ctr"/>
+            <a:endParaRPr lang="en-CA" b="1" dirty="0"/>
+          </a:p>
+        </p:txBody>
+      </p:sp>
+      <p:sp>
+        <p:nvSpPr>
+          <p:cNvPr id="3" name="Rectangle: Rounded Corners 2">
+            <a:extLst>
+              <a:ext uri="{FF2B5EF4-FFF2-40B4-BE49-F238E27FC236}">
+                <a16:creationId xmlns:a16="http://schemas.microsoft.com/office/drawing/2014/main" id="{75C6CB76-D3CC-EE91-3664-31E24E2ABDEE}"/>
+              </a:ext>
+            </a:extLst>
+          </p:cNvPr>
+          <p:cNvSpPr/>
+          <p:nvPr/>
+        </p:nvSpPr>
+        <p:spPr>
+          <a:xfrm>
+            <a:off x="226140" y="4572003"/>
+            <a:ext cx="2566220" cy="1740309"/>
+          </a:xfrm>
+          <a:prstGeom prst="roundRect">
+            <a:avLst/>
+          </a:prstGeom>
+        </p:spPr>
+        <p:style>
+          <a:lnRef idx="2">
+            <a:schemeClr val="accent1">
+              <a:shade val="50000"/>
+            </a:schemeClr>
+          </a:lnRef>
+          <a:fillRef idx="1">
+            <a:schemeClr val="accent1"/>
+          </a:fillRef>
+          <a:effectRef idx="0">
+            <a:schemeClr val="accent1"/>
+          </a:effectRef>
+          <a:fontRef idx="minor">
+            <a:schemeClr val="lt1"/>
+          </a:fontRef>
+        </p:style>
+        <p:txBody>
+          <a:bodyPr rtlCol="0" anchor="ctr"/>
+          <a:lstStyle/>
+          <a:p>
+            <a:pPr algn="ctr"/>
+            <a:r>
+              <a:rPr lang="en-CA" sz="2800" b="1" dirty="0"/>
+              <a:t>(</a:t>
+            </a:r>
+            <a:r>
+              <a:rPr lang="en-CA" sz="2800" b="1" dirty="0" err="1"/>
+              <a:t>cCommand</a:t>
+            </a:r>
+            <a:r>
+              <a:rPr lang="en-CA" sz="2800" b="1" dirty="0"/>
+              <a:t>)</a:t>
+            </a:r>
+          </a:p>
+          <a:p>
+            <a:pPr algn="ctr"/>
+            <a:r>
+              <a:rPr lang="en-CA" sz="2800" b="1" dirty="0" err="1"/>
+              <a:t>eatPrey</a:t>
+            </a:r>
+            <a:endParaRPr lang="en-CA" b="1" dirty="0"/>
+          </a:p>
+        </p:txBody>
+      </p:sp>
+      <p:sp>
+        <p:nvSpPr>
+          <p:cNvPr id="7" name="Rectangle: Rounded Corners 6">
+            <a:extLst>
+              <a:ext uri="{FF2B5EF4-FFF2-40B4-BE49-F238E27FC236}">
+                <a16:creationId xmlns:a16="http://schemas.microsoft.com/office/drawing/2014/main" id="{D92282A6-EE8F-34E5-6CF6-E8F0C9001950}"/>
+              </a:ext>
+            </a:extLst>
+          </p:cNvPr>
+          <p:cNvSpPr/>
+          <p:nvPr/>
+        </p:nvSpPr>
+        <p:spPr>
+          <a:xfrm>
+            <a:off x="7138217" y="4871882"/>
+            <a:ext cx="2566220" cy="1740309"/>
+          </a:xfrm>
+          <a:prstGeom prst="roundRect">
+            <a:avLst/>
+          </a:prstGeom>
+        </p:spPr>
+        <p:style>
+          <a:lnRef idx="2">
+            <a:schemeClr val="accent1">
+              <a:shade val="50000"/>
+            </a:schemeClr>
+          </a:lnRef>
+          <a:fillRef idx="1">
+            <a:schemeClr val="accent1"/>
+          </a:fillRef>
+          <a:effectRef idx="0">
+            <a:schemeClr val="accent1"/>
+          </a:effectRef>
+          <a:fontRef idx="minor">
+            <a:schemeClr val="lt1"/>
+          </a:fontRef>
+        </p:style>
+        <p:txBody>
+          <a:bodyPr rtlCol="0" anchor="ctr"/>
+          <a:lstStyle/>
+          <a:p>
+            <a:pPr algn="ctr"/>
+            <a:r>
+              <a:rPr lang="en-CA" sz="2800" b="1" dirty="0"/>
+              <a:t>(</a:t>
+            </a:r>
+            <a:r>
+              <a:rPr lang="en-CA" sz="2800" b="1" dirty="0" err="1"/>
+              <a:t>cCommand</a:t>
+            </a:r>
+            <a:r>
+              <a:rPr lang="en-CA" sz="2800" b="1" dirty="0"/>
+              <a:t>)</a:t>
+            </a:r>
+          </a:p>
+          <a:p>
+            <a:pPr algn="ctr"/>
+            <a:r>
+              <a:rPr lang="en-CA" sz="2800" b="1" dirty="0" err="1"/>
+              <a:t>chasePrey</a:t>
+            </a:r>
+            <a:endParaRPr lang="en-CA" b="1" dirty="0"/>
+          </a:p>
+        </p:txBody>
+      </p:sp>
+    </p:spTree>
+    <p:extLst>
+      <p:ext uri="{BB962C8B-B14F-4D97-AF65-F5344CB8AC3E}">
+        <p14:creationId xmlns:p14="http://schemas.microsoft.com/office/powerpoint/2010/main" val="448332547"/>
+      </p:ext>
+    </p:extLst>
+  </p:cSld>
+  <p:clrMapOvr>
+    <a:masterClrMapping/>
+  </p:clrMapOvr>
+</p:sld>
+</file>
+
+<file path=ppt/slides/slide6.xml><?xml version="1.0" encoding="utf-8"?>
+<p:sld xmlns:a="http://schemas.openxmlformats.org/drawingml/2006/main" xmlns:r="http://schemas.openxmlformats.org/officeDocument/2006/relationships" xmlns:p="http://schemas.openxmlformats.org/presentationml/2006/main">
+  <p:cSld>
+    <p:spTree>
+      <p:nvGrpSpPr>
+        <p:cNvPr id="1" name=""/>
+        <p:cNvGrpSpPr/>
+        <p:nvPr/>
+      </p:nvGrpSpPr>
+      <p:grpSpPr>
+        <a:xfrm>
+          <a:off x="0" y="0"/>
+          <a:ext cx="0" cy="0"/>
+          <a:chOff x="0" y="0"/>
+          <a:chExt cx="0" cy="0"/>
+        </a:xfrm>
+      </p:grpSpPr>
+      <p:sp>
+        <p:nvSpPr>
+          <p:cNvPr id="4" name="Rectangle: Rounded Corners 3">
+            <a:extLst>
+              <a:ext uri="{FF2B5EF4-FFF2-40B4-BE49-F238E27FC236}">
+                <a16:creationId xmlns:a16="http://schemas.microsoft.com/office/drawing/2014/main" id="{E7F39049-C890-5C23-5B04-F6AC400629B2}"/>
+              </a:ext>
+            </a:extLst>
+          </p:cNvPr>
+          <p:cNvSpPr/>
+          <p:nvPr/>
+        </p:nvSpPr>
+        <p:spPr>
+          <a:xfrm>
+            <a:off x="7993625" y="521112"/>
+            <a:ext cx="3392129" cy="1740309"/>
+          </a:xfrm>
+          <a:prstGeom prst="roundRect">
+            <a:avLst/>
+          </a:prstGeom>
+        </p:spPr>
+        <p:style>
+          <a:lnRef idx="2">
+            <a:schemeClr val="accent1">
+              <a:shade val="50000"/>
+            </a:schemeClr>
+          </a:lnRef>
+          <a:fillRef idx="1">
+            <a:schemeClr val="accent1"/>
+          </a:fillRef>
+          <a:effectRef idx="0">
+            <a:schemeClr val="accent1"/>
+          </a:effectRef>
+          <a:fontRef idx="minor">
+            <a:schemeClr val="lt1"/>
+          </a:fontRef>
+        </p:style>
+        <p:txBody>
+          <a:bodyPr rtlCol="0" anchor="ctr"/>
+          <a:lstStyle/>
+          <a:p>
+            <a:pPr algn="ctr"/>
+            <a:r>
+              <a:rPr lang="en-CA" sz="2800" b="1" dirty="0"/>
+              <a:t>Bunny::</a:t>
+            </a:r>
+            <a:r>
+              <a:rPr lang="en-CA" sz="2800" b="1" dirty="0" err="1"/>
+              <a:t>cAnimal</a:t>
+            </a:r>
+            <a:endParaRPr lang="en-CA" b="1" dirty="0"/>
+          </a:p>
+          <a:p>
+            <a:pPr algn="ctr"/>
+            <a:r>
+              <a:rPr lang="en-CA" dirty="0" err="1"/>
+              <a:t>findPrey</a:t>
+            </a:r>
+            <a:r>
+              <a:rPr lang="en-CA" dirty="0"/>
+              <a:t>()</a:t>
+            </a:r>
+          </a:p>
+          <a:p>
+            <a:pPr algn="ctr"/>
+            <a:r>
+              <a:rPr lang="en-CA" dirty="0" err="1"/>
+              <a:t>chasePrey</a:t>
+            </a:r>
+            <a:r>
+              <a:rPr lang="en-CA" dirty="0"/>
+              <a:t>()</a:t>
+            </a:r>
+          </a:p>
+          <a:p>
+            <a:pPr algn="ctr"/>
+            <a:r>
+              <a:rPr lang="en-CA" dirty="0" err="1"/>
+              <a:t>eatPrey</a:t>
+            </a:r>
+            <a:r>
+              <a:rPr lang="en-CA" dirty="0"/>
+              <a:t>()</a:t>
+            </a:r>
+          </a:p>
+        </p:txBody>
+      </p:sp>
+      <p:sp>
+        <p:nvSpPr>
+          <p:cNvPr id="2" name="Rectangle: Rounded Corners 1">
+            <a:extLst>
+              <a:ext uri="{FF2B5EF4-FFF2-40B4-BE49-F238E27FC236}">
+                <a16:creationId xmlns:a16="http://schemas.microsoft.com/office/drawing/2014/main" id="{CA7DCDD7-6751-5047-7FF5-D197700DD191}"/>
+              </a:ext>
+            </a:extLst>
+          </p:cNvPr>
+          <p:cNvSpPr/>
+          <p:nvPr/>
+        </p:nvSpPr>
+        <p:spPr>
+          <a:xfrm>
+            <a:off x="1052052" y="521112"/>
+            <a:ext cx="3224980" cy="1740309"/>
+          </a:xfrm>
+          <a:prstGeom prst="roundRect">
+            <a:avLst/>
+          </a:prstGeom>
+        </p:spPr>
+        <p:style>
+          <a:lnRef idx="2">
+            <a:schemeClr val="accent1">
+              <a:shade val="50000"/>
+            </a:schemeClr>
+          </a:lnRef>
+          <a:fillRef idx="1">
+            <a:schemeClr val="accent1"/>
+          </a:fillRef>
+          <a:effectRef idx="0">
+            <a:schemeClr val="accent1"/>
+          </a:effectRef>
+          <a:fontRef idx="minor">
+            <a:schemeClr val="lt1"/>
+          </a:fontRef>
+        </p:style>
+        <p:txBody>
+          <a:bodyPr rtlCol="0" anchor="ctr"/>
+          <a:lstStyle/>
+          <a:p>
+            <a:pPr algn="ctr"/>
+            <a:r>
+              <a:rPr lang="en-CA" sz="2800" b="1" dirty="0"/>
+              <a:t>Wolf::</a:t>
+            </a:r>
+            <a:r>
+              <a:rPr lang="en-CA" sz="2800" b="1" dirty="0" err="1"/>
+              <a:t>cAnimal</a:t>
+            </a:r>
+            <a:endParaRPr lang="en-CA" b="1" dirty="0"/>
+          </a:p>
+          <a:p>
+            <a:pPr algn="ctr"/>
+            <a:r>
+              <a:rPr lang="en-CA" dirty="0" err="1"/>
+              <a:t>findPrey</a:t>
+            </a:r>
+            <a:r>
+              <a:rPr lang="en-CA" dirty="0"/>
+              <a:t>()</a:t>
+            </a:r>
+          </a:p>
+          <a:p>
+            <a:pPr algn="ctr"/>
+            <a:r>
+              <a:rPr lang="en-CA" dirty="0" err="1"/>
+              <a:t>chasePrey</a:t>
+            </a:r>
+            <a:r>
+              <a:rPr lang="en-CA" dirty="0"/>
+              <a:t>()</a:t>
+            </a:r>
+          </a:p>
+          <a:p>
+            <a:pPr algn="ctr"/>
+            <a:r>
+              <a:rPr lang="en-CA" dirty="0" err="1"/>
+              <a:t>eatPrey</a:t>
+            </a:r>
+            <a:r>
+              <a:rPr lang="en-CA" dirty="0"/>
+              <a:t>()</a:t>
+            </a:r>
+          </a:p>
+        </p:txBody>
+      </p:sp>
+    </p:spTree>
+    <p:extLst>
+      <p:ext uri="{BB962C8B-B14F-4D97-AF65-F5344CB8AC3E}">
+        <p14:creationId xmlns:p14="http://schemas.microsoft.com/office/powerpoint/2010/main" val="3130503745"/>
+      </p:ext>
+    </p:extLst>
+  </p:cSld>
+  <p:clrMapOvr>
+    <a:masterClrMapping/>
+  </p:clrMapOvr>
+</p:sld>
+</file>
+
+<file path=ppt/slides/slide7.xml><?xml version="1.0" encoding="utf-8"?>
+<p:sld xmlns:a="http://schemas.openxmlformats.org/drawingml/2006/main" xmlns:r="http://schemas.openxmlformats.org/officeDocument/2006/relationships" xmlns:p="http://schemas.openxmlformats.org/presentationml/2006/main">
+  <p:cSld>
+    <p:spTree>
+      <p:nvGrpSpPr>
+        <p:cNvPr id="1" name=""/>
+        <p:cNvGrpSpPr/>
+        <p:nvPr/>
+      </p:nvGrpSpPr>
+      <p:grpSpPr>
+        <a:xfrm>
+          <a:off x="0" y="0"/>
+          <a:ext cx="0" cy="0"/>
+          <a:chOff x="0" y="0"/>
+          <a:chExt cx="0" cy="0"/>
+        </a:xfrm>
+      </p:grpSpPr>
+      <p:sp>
+        <p:nvSpPr>
+          <p:cNvPr id="4" name="Rectangle: Rounded Corners 3">
+            <a:extLst>
+              <a:ext uri="{FF2B5EF4-FFF2-40B4-BE49-F238E27FC236}">
+                <a16:creationId xmlns:a16="http://schemas.microsoft.com/office/drawing/2014/main" id="{E7F39049-C890-5C23-5B04-F6AC400629B2}"/>
+              </a:ext>
+            </a:extLst>
+          </p:cNvPr>
+          <p:cNvSpPr/>
+          <p:nvPr/>
+        </p:nvSpPr>
+        <p:spPr>
+          <a:xfrm>
+            <a:off x="7796980" y="353962"/>
+            <a:ext cx="2566220" cy="2163094"/>
+          </a:xfrm>
+          <a:prstGeom prst="roundRect">
+            <a:avLst/>
+          </a:prstGeom>
+        </p:spPr>
+        <p:style>
+          <a:lnRef idx="2">
+            <a:schemeClr val="accent1">
+              <a:shade val="50000"/>
+            </a:schemeClr>
+          </a:lnRef>
+          <a:fillRef idx="1">
+            <a:schemeClr val="accent1"/>
+          </a:fillRef>
+          <a:effectRef idx="0">
+            <a:schemeClr val="accent1"/>
+          </a:effectRef>
+          <a:fontRef idx="minor">
+            <a:schemeClr val="lt1"/>
+          </a:fontRef>
+        </p:style>
+        <p:txBody>
+          <a:bodyPr rtlCol="0" anchor="ctr"/>
+          <a:lstStyle/>
+          <a:p>
+            <a:pPr algn="ctr"/>
+            <a:r>
+              <a:rPr lang="en-CA" sz="2800" b="1" dirty="0" err="1"/>
+              <a:t>cAnimal</a:t>
+            </a:r>
+            <a:endParaRPr lang="en-CA" b="1" dirty="0"/>
+          </a:p>
+          <a:p>
+            <a:pPr algn="ctr"/>
+            <a:r>
+              <a:rPr lang="en-CA" dirty="0"/>
+              <a:t>Turn();</a:t>
+            </a:r>
+          </a:p>
+          <a:p>
+            <a:pPr algn="ctr"/>
+            <a:r>
+              <a:rPr lang="en-CA" dirty="0"/>
+              <a:t>Move();</a:t>
+            </a:r>
+          </a:p>
+          <a:p>
+            <a:pPr algn="ctr"/>
+            <a:r>
+              <a:rPr lang="en-CA" dirty="0"/>
+              <a:t>Rest();</a:t>
+            </a:r>
+          </a:p>
+        </p:txBody>
+      </p:sp>
+      <p:sp>
+        <p:nvSpPr>
+          <p:cNvPr id="2" name="Rectangle: Rounded Corners 1">
+            <a:extLst>
+              <a:ext uri="{FF2B5EF4-FFF2-40B4-BE49-F238E27FC236}">
+                <a16:creationId xmlns:a16="http://schemas.microsoft.com/office/drawing/2014/main" id="{5CC9F4D4-F96B-D681-E028-D1CC153A3B99}"/>
+              </a:ext>
+            </a:extLst>
+          </p:cNvPr>
+          <p:cNvSpPr/>
+          <p:nvPr/>
+        </p:nvSpPr>
+        <p:spPr>
+          <a:xfrm>
+            <a:off x="555523" y="722671"/>
+            <a:ext cx="3239729" cy="1425676"/>
+          </a:xfrm>
+          <a:prstGeom prst="roundRect">
+            <a:avLst/>
+          </a:prstGeom>
+        </p:spPr>
+        <p:style>
+          <a:lnRef idx="2">
+            <a:schemeClr val="accent1">
+              <a:shade val="50000"/>
+            </a:schemeClr>
+          </a:lnRef>
+          <a:fillRef idx="1">
+            <a:schemeClr val="accent1"/>
+          </a:fillRef>
+          <a:effectRef idx="0">
+            <a:schemeClr val="accent1"/>
+          </a:effectRef>
+          <a:fontRef idx="minor">
+            <a:schemeClr val="lt1"/>
+          </a:fontRef>
+        </p:style>
+        <p:txBody>
+          <a:bodyPr rtlCol="0" anchor="ctr"/>
+          <a:lstStyle/>
+          <a:p>
+            <a:pPr algn="ctr"/>
+            <a:r>
+              <a:rPr lang="en-CA" sz="2800" b="1" dirty="0"/>
+              <a:t>(</a:t>
+            </a:r>
+            <a:r>
+              <a:rPr lang="en-CA" sz="2800" b="1" dirty="0" err="1"/>
+              <a:t>cCommand</a:t>
+            </a:r>
+            <a:r>
+              <a:rPr lang="en-CA" sz="2800" b="1" dirty="0"/>
+              <a:t>)</a:t>
+            </a:r>
+          </a:p>
+          <a:p>
+            <a:pPr algn="ctr"/>
+            <a:r>
+              <a:rPr lang="en-CA" sz="2800" b="1" dirty="0" err="1"/>
+              <a:t>findPrey</a:t>
+            </a:r>
+            <a:endParaRPr lang="en-CA" b="1" dirty="0"/>
+          </a:p>
+        </p:txBody>
+      </p:sp>
+      <p:cxnSp>
+        <p:nvCxnSpPr>
+          <p:cNvPr id="5" name="Straight Arrow Connector 4">
+            <a:extLst>
+              <a:ext uri="{FF2B5EF4-FFF2-40B4-BE49-F238E27FC236}">
+                <a16:creationId xmlns:a16="http://schemas.microsoft.com/office/drawing/2014/main" id="{B5FFC1DD-B0C0-7BF7-CD82-5F0A410D99D1}"/>
+              </a:ext>
+            </a:extLst>
+          </p:cNvPr>
+          <p:cNvCxnSpPr>
+            <a:cxnSpLocks/>
+            <a:stCxn id="2" idx="3"/>
+            <a:endCxn id="4" idx="1"/>
+          </p:cNvCxnSpPr>
+          <p:nvPr/>
+        </p:nvCxnSpPr>
+        <p:spPr>
+          <a:xfrm>
+            <a:off x="3795252" y="1435509"/>
+            <a:ext cx="4001728" cy="0"/>
+          </a:xfrm>
+          <a:prstGeom prst="straightConnector1">
+            <a:avLst/>
+          </a:prstGeom>
+          <a:ln w="114300">
+            <a:headEnd type="none"/>
+            <a:tailEnd type="stealth"/>
+          </a:ln>
+        </p:spPr>
+        <p:style>
+          <a:lnRef idx="3">
+            <a:schemeClr val="accent1"/>
+          </a:lnRef>
+          <a:fillRef idx="0">
+            <a:schemeClr val="accent1"/>
+          </a:fillRef>
+          <a:effectRef idx="2">
+            <a:schemeClr val="accent1"/>
+          </a:effectRef>
+          <a:fontRef idx="minor">
+            <a:schemeClr val="tx1"/>
+          </a:fontRef>
+        </p:style>
+      </p:cxnSp>
+      <p:sp>
+        <p:nvSpPr>
+          <p:cNvPr id="11" name="Rectangle: Rounded Corners 10">
+            <a:extLst>
+              <a:ext uri="{FF2B5EF4-FFF2-40B4-BE49-F238E27FC236}">
+                <a16:creationId xmlns:a16="http://schemas.microsoft.com/office/drawing/2014/main" id="{5E2D33F6-F167-FCD4-8E4A-07B01A9C14B4}"/>
+              </a:ext>
+            </a:extLst>
+          </p:cNvPr>
+          <p:cNvSpPr/>
+          <p:nvPr/>
+        </p:nvSpPr>
+        <p:spPr>
+          <a:xfrm>
+            <a:off x="3795252" y="3864078"/>
+            <a:ext cx="4748980" cy="2163094"/>
+          </a:xfrm>
+          <a:prstGeom prst="roundRect">
+            <a:avLst/>
+          </a:prstGeom>
+        </p:spPr>
+        <p:style>
+          <a:lnRef idx="2">
+            <a:schemeClr val="accent1">
+              <a:shade val="50000"/>
+            </a:schemeClr>
+          </a:lnRef>
+          <a:fillRef idx="1">
+            <a:schemeClr val="accent1"/>
+          </a:fillRef>
+          <a:effectRef idx="0">
+            <a:schemeClr val="accent1"/>
+          </a:effectRef>
+          <a:fontRef idx="minor">
+            <a:schemeClr val="lt1"/>
+          </a:fontRef>
+        </p:style>
+        <p:txBody>
+          <a:bodyPr rtlCol="0" anchor="ctr"/>
+          <a:lstStyle/>
+          <a:p>
+            <a:pPr algn="ctr"/>
+            <a:r>
+              <a:rPr lang="en-CA" sz="2800" b="1" dirty="0" err="1"/>
+              <a:t>cAnimal</a:t>
+            </a:r>
+            <a:endParaRPr lang="en-CA" b="1" dirty="0"/>
+          </a:p>
+          <a:p>
+            <a:pPr algn="ctr"/>
+            <a:r>
+              <a:rPr lang="en-CA" dirty="0"/>
+              <a:t>Turn();</a:t>
+            </a:r>
+          </a:p>
+          <a:p>
+            <a:pPr algn="ctr"/>
+            <a:r>
+              <a:rPr lang="en-CA" dirty="0"/>
+              <a:t>Move();</a:t>
+            </a:r>
+          </a:p>
+          <a:p>
+            <a:pPr algn="ctr"/>
+            <a:r>
+              <a:rPr lang="en-CA" dirty="0"/>
+              <a:t>Rest();</a:t>
+            </a:r>
+          </a:p>
+          <a:p>
+            <a:pPr algn="ctr"/>
+            <a:r>
+              <a:rPr lang="en-CA" dirty="0" err="1"/>
+              <a:t>addCommand</a:t>
+            </a:r>
+            <a:r>
+              <a:rPr lang="en-CA" dirty="0"/>
+              <a:t>( </a:t>
+            </a:r>
+            <a:r>
+              <a:rPr lang="en-CA" dirty="0" err="1"/>
+              <a:t>cCommand</a:t>
+            </a:r>
+            <a:r>
+              <a:rPr lang="en-CA" dirty="0"/>
+              <a:t> </a:t>
+            </a:r>
+            <a:r>
+              <a:rPr lang="en-CA" dirty="0" err="1"/>
+              <a:t>pTheCommand</a:t>
+            </a:r>
+            <a:r>
+              <a:rPr lang="en-CA" dirty="0"/>
+              <a:t> ) </a:t>
+            </a:r>
+          </a:p>
+        </p:txBody>
+      </p:sp>
+    </p:spTree>
+    <p:extLst>
+      <p:ext uri="{BB962C8B-B14F-4D97-AF65-F5344CB8AC3E}">
+        <p14:creationId xmlns:p14="http://schemas.microsoft.com/office/powerpoint/2010/main" val="849879084"/>
       </p:ext>
     </p:extLst>
   </p:cSld>

</xml_diff>